<commit_message>
added dual rmse dcg plots
</commit_message>
<xml_diff>
--- a/poster/ohollaren_poster.pptx
+++ b/poster/ohollaren_poster.pptx
@@ -8401,7 +8401,7 @@
       </p:sp>
       <p:pic>
         <p:nvPicPr>
-          <p:cNvPr id="16" name="Picture 15" descr="lin_reg_learning_curve.eps.png"/>
+          <p:cNvPr id="17" name="Picture 16" descr="top30_lin_reg_all_feat.eps.png"/>
           <p:cNvPicPr>
             <a:picLocks noChangeAspect="1"/>
           </p:cNvPicPr>
@@ -8415,8 +8415,8 @@
         </p:blipFill>
         <p:spPr>
           <a:xfrm>
-            <a:off x="22537925" y="15436832"/>
-            <a:ext cx="10207857" cy="13214350"/>
+            <a:off x="22537925" y="9741402"/>
+            <a:ext cx="9720076" cy="12573232"/>
           </a:xfrm>
           <a:prstGeom prst="rect">
             <a:avLst/>
@@ -8425,7 +8425,7 @@
       </p:pic>
       <p:pic>
         <p:nvPicPr>
-          <p:cNvPr id="17" name="Picture 16" descr="top30_lin_reg_all_feat.eps.png"/>
+          <p:cNvPr id="18" name="Picture 17" descr="rmse_plus_dcg.png"/>
           <p:cNvPicPr>
             <a:picLocks noChangeAspect="1"/>
           </p:cNvPicPr>
@@ -8439,8 +8439,8 @@
         </p:blipFill>
         <p:spPr>
           <a:xfrm>
-            <a:off x="22537925" y="9741402"/>
-            <a:ext cx="9720076" cy="12573232"/>
+            <a:off x="22537925" y="17741203"/>
+            <a:ext cx="9720076" cy="12577779"/>
           </a:xfrm>
           <a:prstGeom prst="rect">
             <a:avLst/>

</xml_diff>